<commit_message>
Ajout de test fonctionners sur TestTwitterAnalysis.py
</commit_message>
<xml_diff>
--- a/partie hamed.pptx
+++ b/partie hamed.pptx
@@ -5,7 +5,7 @@
     <p:sldMasterId id="2147483668" r:id="rId1"/>
   </p:sldMasterIdLst>
   <p:notesMasterIdLst>
-    <p:notesMasterId r:id="rId18"/>
+    <p:notesMasterId r:id="rId19"/>
   </p:notesMasterIdLst>
   <p:sldIdLst>
     <p:sldId id="256" r:id="rId2"/>
@@ -14,37 +14,38 @@
     <p:sldId id="286" r:id="rId5"/>
     <p:sldId id="288" r:id="rId6"/>
     <p:sldId id="283" r:id="rId7"/>
-    <p:sldId id="282" r:id="rId8"/>
-    <p:sldId id="261" r:id="rId9"/>
-    <p:sldId id="287" r:id="rId10"/>
-    <p:sldId id="263" r:id="rId11"/>
-    <p:sldId id="281" r:id="rId12"/>
-    <p:sldId id="289" r:id="rId13"/>
-    <p:sldId id="284" r:id="rId14"/>
-    <p:sldId id="285" r:id="rId15"/>
-    <p:sldId id="290" r:id="rId16"/>
-    <p:sldId id="291" r:id="rId17"/>
+    <p:sldId id="293" r:id="rId8"/>
+    <p:sldId id="282" r:id="rId9"/>
+    <p:sldId id="261" r:id="rId10"/>
+    <p:sldId id="287" r:id="rId11"/>
+    <p:sldId id="263" r:id="rId12"/>
+    <p:sldId id="281" r:id="rId13"/>
+    <p:sldId id="289" r:id="rId14"/>
+    <p:sldId id="284" r:id="rId15"/>
+    <p:sldId id="285" r:id="rId16"/>
+    <p:sldId id="290" r:id="rId17"/>
+    <p:sldId id="291" r:id="rId18"/>
   </p:sldIdLst>
   <p:sldSz cx="12192000" cy="6858000"/>
   <p:notesSz cx="6858000" cy="9144000"/>
   <p:embeddedFontLst>
     <p:embeddedFont>
       <p:font typeface="Abril Fatface" panose="02000503000000020003" pitchFamily="2" charset="0"/>
-      <p:regular r:id="rId19"/>
+      <p:regular r:id="rId20"/>
     </p:embeddedFont>
     <p:embeddedFont>
       <p:font typeface="Roboto" panose="02000000000000000000" pitchFamily="2" charset="0"/>
-      <p:regular r:id="rId20"/>
-      <p:bold r:id="rId21"/>
-      <p:italic r:id="rId22"/>
-      <p:boldItalic r:id="rId23"/>
+      <p:regular r:id="rId21"/>
+      <p:bold r:id="rId22"/>
+      <p:italic r:id="rId23"/>
+      <p:boldItalic r:id="rId24"/>
     </p:embeddedFont>
     <p:embeddedFont>
       <p:font typeface="Roboto Mono" panose="00000009000000000000" pitchFamily="49" charset="0"/>
-      <p:regular r:id="rId24"/>
-      <p:bold r:id="rId25"/>
-      <p:italic r:id="rId26"/>
-      <p:boldItalic r:id="rId27"/>
+      <p:regular r:id="rId25"/>
+      <p:bold r:id="rId26"/>
+      <p:italic r:id="rId27"/>
+      <p:boldItalic r:id="rId28"/>
     </p:embeddedFont>
   </p:embeddedFontLst>
   <p:defaultTextStyle>
@@ -937,6 +938,11 @@
         </p:txBody>
       </p:sp>
     </p:spTree>
+    <p:extLst>
+      <p:ext uri="{BB962C8B-B14F-4D97-AF65-F5344CB8AC3E}">
+        <p14:creationId xmlns:p14="http://schemas.microsoft.com/office/powerpoint/2010/main" val="1414620248"/>
+      </p:ext>
+    </p:extLst>
   </p:cSld>
   <p:clrMapOvr>
     <a:masterClrMapping/>
@@ -1041,11 +1047,6 @@
         </p:txBody>
       </p:sp>
     </p:spTree>
-    <p:extLst>
-      <p:ext uri="{BB962C8B-B14F-4D97-AF65-F5344CB8AC3E}">
-        <p14:creationId xmlns:p14="http://schemas.microsoft.com/office/powerpoint/2010/main" val="1124610434"/>
-      </p:ext>
-    </p:extLst>
   </p:cSld>
   <p:clrMapOvr>
     <a:masterClrMapping/>
@@ -1152,7 +1153,7 @@
     </p:spTree>
     <p:extLst>
       <p:ext uri="{BB962C8B-B14F-4D97-AF65-F5344CB8AC3E}">
-        <p14:creationId xmlns:p14="http://schemas.microsoft.com/office/powerpoint/2010/main" val="4073946641"/>
+        <p14:creationId xmlns:p14="http://schemas.microsoft.com/office/powerpoint/2010/main" val="1124610434"/>
       </p:ext>
     </p:extLst>
   </p:cSld>
@@ -1261,7 +1262,7 @@
     </p:spTree>
     <p:extLst>
       <p:ext uri="{BB962C8B-B14F-4D97-AF65-F5344CB8AC3E}">
-        <p14:creationId xmlns:p14="http://schemas.microsoft.com/office/powerpoint/2010/main" val="757329935"/>
+        <p14:creationId xmlns:p14="http://schemas.microsoft.com/office/powerpoint/2010/main" val="4073946641"/>
       </p:ext>
     </p:extLst>
   </p:cSld>
@@ -1276,7 +1277,7 @@
   <p:cSld>
     <p:spTree>
       <p:nvGrpSpPr>
-        <p:cNvPr id="1" name="Shape 508"/>
+        <p:cNvPr id="1" name="Shape 436"/>
         <p:cNvGrpSpPr/>
         <p:nvPr/>
       </p:nvGrpSpPr>
@@ -1290,7 +1291,7 @@
       </p:grpSpPr>
       <p:sp>
         <p:nvSpPr>
-          <p:cNvPr id="509" name="Google Shape;509;g111c3728c19_0_120:notes"/>
+          <p:cNvPr id="437" name="Google Shape;437;ga073618e60_0_106:notes"/>
           <p:cNvSpPr>
             <a:spLocks noGrp="1" noRot="1" noChangeAspect="1"/>
           </p:cNvSpPr>
@@ -1331,7 +1332,7 @@
       </p:sp>
       <p:sp>
         <p:nvSpPr>
-          <p:cNvPr id="510" name="Google Shape;510;g111c3728c19_0_120:notes"/>
+          <p:cNvPr id="438" name="Google Shape;438;ga073618e60_0_106:notes"/>
           <p:cNvSpPr txBox="1">
             <a:spLocks noGrp="1"/>
           </p:cNvSpPr>
@@ -1370,7 +1371,7 @@
     </p:spTree>
     <p:extLst>
       <p:ext uri="{BB962C8B-B14F-4D97-AF65-F5344CB8AC3E}">
-        <p14:creationId xmlns:p14="http://schemas.microsoft.com/office/powerpoint/2010/main" val="590021687"/>
+        <p14:creationId xmlns:p14="http://schemas.microsoft.com/office/powerpoint/2010/main" val="757329935"/>
       </p:ext>
     </p:extLst>
   </p:cSld>
@@ -1479,6 +1480,115 @@
     </p:spTree>
     <p:extLst>
       <p:ext uri="{BB962C8B-B14F-4D97-AF65-F5344CB8AC3E}">
+        <p14:creationId xmlns:p14="http://schemas.microsoft.com/office/powerpoint/2010/main" val="590021687"/>
+      </p:ext>
+    </p:extLst>
+  </p:cSld>
+  <p:clrMapOvr>
+    <a:masterClrMapping/>
+  </p:clrMapOvr>
+</p:notes>
+</file>
+
+<file path=ppt/notesSlides/notesSlide16.xml><?xml version="1.0" encoding="utf-8"?>
+<p:notes xmlns:a="http://schemas.openxmlformats.org/drawingml/2006/main" xmlns:r="http://schemas.openxmlformats.org/officeDocument/2006/relationships" xmlns:p="http://schemas.openxmlformats.org/presentationml/2006/main" showMasterSp="0" showMasterPhAnim="0">
+  <p:cSld>
+    <p:spTree>
+      <p:nvGrpSpPr>
+        <p:cNvPr id="1" name="Shape 508"/>
+        <p:cNvGrpSpPr/>
+        <p:nvPr/>
+      </p:nvGrpSpPr>
+      <p:grpSpPr>
+        <a:xfrm>
+          <a:off x="0" y="0"/>
+          <a:ext cx="0" cy="0"/>
+          <a:chOff x="0" y="0"/>
+          <a:chExt cx="0" cy="0"/>
+        </a:xfrm>
+      </p:grpSpPr>
+      <p:sp>
+        <p:nvSpPr>
+          <p:cNvPr id="509" name="Google Shape;509;g111c3728c19_0_120:notes"/>
+          <p:cNvSpPr>
+            <a:spLocks noGrp="1" noRot="1" noChangeAspect="1"/>
+          </p:cNvSpPr>
+          <p:nvPr>
+            <p:ph type="sldImg" idx="2"/>
+          </p:nvPr>
+        </p:nvSpPr>
+        <p:spPr>
+          <a:xfrm>
+            <a:off x="381000" y="685800"/>
+            <a:ext cx="6096000" cy="3429000"/>
+          </a:xfrm>
+          <a:custGeom>
+            <a:avLst/>
+            <a:gdLst/>
+            <a:ahLst/>
+            <a:cxnLst/>
+            <a:rect l="l" t="t" r="r" b="b"/>
+            <a:pathLst>
+              <a:path w="120000" h="120000" extrusionOk="0">
+                <a:moveTo>
+                  <a:pt x="0" y="0"/>
+                </a:moveTo>
+                <a:lnTo>
+                  <a:pt x="120000" y="0"/>
+                </a:lnTo>
+                <a:lnTo>
+                  <a:pt x="120000" y="120000"/>
+                </a:lnTo>
+                <a:lnTo>
+                  <a:pt x="0" y="120000"/>
+                </a:lnTo>
+                <a:close/>
+              </a:path>
+            </a:pathLst>
+          </a:custGeom>
+        </p:spPr>
+      </p:sp>
+      <p:sp>
+        <p:nvSpPr>
+          <p:cNvPr id="510" name="Google Shape;510;g111c3728c19_0_120:notes"/>
+          <p:cNvSpPr txBox="1">
+            <a:spLocks noGrp="1"/>
+          </p:cNvSpPr>
+          <p:nvPr>
+            <p:ph type="body" idx="1"/>
+          </p:nvPr>
+        </p:nvSpPr>
+        <p:spPr>
+          <a:xfrm>
+            <a:off x="685800" y="4343400"/>
+            <a:ext cx="5486400" cy="4114800"/>
+          </a:xfrm>
+          <a:prstGeom prst="rect">
+            <a:avLst/>
+          </a:prstGeom>
+        </p:spPr>
+        <p:txBody>
+          <a:bodyPr spcFirstLastPara="1" wrap="square" lIns="91425" tIns="91425" rIns="91425" bIns="91425" anchor="t" anchorCtr="0">
+            <a:noAutofit/>
+          </a:bodyPr>
+          <a:lstStyle/>
+          <a:p>
+            <a:pPr marL="0" lvl="0" indent="0" algn="l" rtl="0">
+              <a:spcBef>
+                <a:spcPts val="0"/>
+              </a:spcBef>
+              <a:spcAft>
+                <a:spcPts val="0"/>
+              </a:spcAft>
+              <a:buNone/>
+            </a:pPr>
+            <a:endParaRPr/>
+          </a:p>
+        </p:txBody>
+      </p:sp>
+    </p:spTree>
+    <p:extLst>
+      <p:ext uri="{BB962C8B-B14F-4D97-AF65-F5344CB8AC3E}">
         <p14:creationId xmlns:p14="http://schemas.microsoft.com/office/powerpoint/2010/main" val="1193197895"/>
       </p:ext>
     </p:extLst>
@@ -1489,7 +1599,7 @@
 </p:notes>
 </file>
 
-<file path=ppt/notesSlides/notesSlide16.xml><?xml version="1.0" encoding="utf-8"?>
+<file path=ppt/notesSlides/notesSlide17.xml><?xml version="1.0" encoding="utf-8"?>
 <p:notes xmlns:a="http://schemas.openxmlformats.org/drawingml/2006/main" xmlns:r="http://schemas.openxmlformats.org/officeDocument/2006/relationships" xmlns:p="http://schemas.openxmlformats.org/presentationml/2006/main" showMasterSp="0" showMasterPhAnim="0">
   <p:cSld>
     <p:spTree>
@@ -2148,6 +2258,115 @@
   <p:cSld>
     <p:spTree>
       <p:nvGrpSpPr>
+        <p:cNvPr id="1" name="Shape 436"/>
+        <p:cNvGrpSpPr/>
+        <p:nvPr/>
+      </p:nvGrpSpPr>
+      <p:grpSpPr>
+        <a:xfrm>
+          <a:off x="0" y="0"/>
+          <a:ext cx="0" cy="0"/>
+          <a:chOff x="0" y="0"/>
+          <a:chExt cx="0" cy="0"/>
+        </a:xfrm>
+      </p:grpSpPr>
+      <p:sp>
+        <p:nvSpPr>
+          <p:cNvPr id="437" name="Google Shape;437;ga073618e60_0_106:notes"/>
+          <p:cNvSpPr>
+            <a:spLocks noGrp="1" noRot="1" noChangeAspect="1"/>
+          </p:cNvSpPr>
+          <p:nvPr>
+            <p:ph type="sldImg" idx="2"/>
+          </p:nvPr>
+        </p:nvSpPr>
+        <p:spPr>
+          <a:xfrm>
+            <a:off x="381000" y="685800"/>
+            <a:ext cx="6096000" cy="3429000"/>
+          </a:xfrm>
+          <a:custGeom>
+            <a:avLst/>
+            <a:gdLst/>
+            <a:ahLst/>
+            <a:cxnLst/>
+            <a:rect l="l" t="t" r="r" b="b"/>
+            <a:pathLst>
+              <a:path w="120000" h="120000" extrusionOk="0">
+                <a:moveTo>
+                  <a:pt x="0" y="0"/>
+                </a:moveTo>
+                <a:lnTo>
+                  <a:pt x="120000" y="0"/>
+                </a:lnTo>
+                <a:lnTo>
+                  <a:pt x="120000" y="120000"/>
+                </a:lnTo>
+                <a:lnTo>
+                  <a:pt x="0" y="120000"/>
+                </a:lnTo>
+                <a:close/>
+              </a:path>
+            </a:pathLst>
+          </a:custGeom>
+        </p:spPr>
+      </p:sp>
+      <p:sp>
+        <p:nvSpPr>
+          <p:cNvPr id="438" name="Google Shape;438;ga073618e60_0_106:notes"/>
+          <p:cNvSpPr txBox="1">
+            <a:spLocks noGrp="1"/>
+          </p:cNvSpPr>
+          <p:nvPr>
+            <p:ph type="body" idx="1"/>
+          </p:nvPr>
+        </p:nvSpPr>
+        <p:spPr>
+          <a:xfrm>
+            <a:off x="685800" y="4343400"/>
+            <a:ext cx="5486400" cy="4114800"/>
+          </a:xfrm>
+          <a:prstGeom prst="rect">
+            <a:avLst/>
+          </a:prstGeom>
+        </p:spPr>
+        <p:txBody>
+          <a:bodyPr spcFirstLastPara="1" wrap="square" lIns="91425" tIns="91425" rIns="91425" bIns="91425" anchor="t" anchorCtr="0">
+            <a:noAutofit/>
+          </a:bodyPr>
+          <a:lstStyle/>
+          <a:p>
+            <a:pPr marL="0" lvl="0" indent="0" algn="l" rtl="0">
+              <a:spcBef>
+                <a:spcPts val="0"/>
+              </a:spcBef>
+              <a:spcAft>
+                <a:spcPts val="0"/>
+              </a:spcAft>
+              <a:buNone/>
+            </a:pPr>
+            <a:endParaRPr/>
+          </a:p>
+        </p:txBody>
+      </p:sp>
+    </p:spTree>
+    <p:extLst>
+      <p:ext uri="{BB962C8B-B14F-4D97-AF65-F5344CB8AC3E}">
+        <p14:creationId xmlns:p14="http://schemas.microsoft.com/office/powerpoint/2010/main" val="478318313"/>
+      </p:ext>
+    </p:extLst>
+  </p:cSld>
+  <p:clrMapOvr>
+    <a:masterClrMapping/>
+  </p:clrMapOvr>
+</p:notes>
+</file>
+
+<file path=ppt/notesSlides/notesSlide8.xml><?xml version="1.0" encoding="utf-8"?>
+<p:notes xmlns:a="http://schemas.openxmlformats.org/drawingml/2006/main" xmlns:r="http://schemas.openxmlformats.org/officeDocument/2006/relationships" xmlns:p="http://schemas.openxmlformats.org/presentationml/2006/main" showMasterSp="0" showMasterPhAnim="0">
+  <p:cSld>
+    <p:spTree>
+      <p:nvGrpSpPr>
         <p:cNvPr id="1" name="Shape 508"/>
         <p:cNvGrpSpPr/>
         <p:nvPr/>
@@ -2252,7 +2471,7 @@
 </p:notes>
 </file>
 
-<file path=ppt/notesSlides/notesSlide8.xml><?xml version="1.0" encoding="utf-8"?>
+<file path=ppt/notesSlides/notesSlide9.xml><?xml version="1.0" encoding="utf-8"?>
 <p:notes xmlns:a="http://schemas.openxmlformats.org/drawingml/2006/main" xmlns:r="http://schemas.openxmlformats.org/officeDocument/2006/relationships" xmlns:p="http://schemas.openxmlformats.org/presentationml/2006/main" showMasterSp="0" showMasterPhAnim="0">
   <p:cSld>
     <p:spTree>
@@ -2349,115 +2568,6 @@
         </p:txBody>
       </p:sp>
     </p:spTree>
-  </p:cSld>
-  <p:clrMapOvr>
-    <a:masterClrMapping/>
-  </p:clrMapOvr>
-</p:notes>
-</file>
-
-<file path=ppt/notesSlides/notesSlide9.xml><?xml version="1.0" encoding="utf-8"?>
-<p:notes xmlns:a="http://schemas.openxmlformats.org/drawingml/2006/main" xmlns:r="http://schemas.openxmlformats.org/officeDocument/2006/relationships" xmlns:p="http://schemas.openxmlformats.org/presentationml/2006/main" showMasterSp="0" showMasterPhAnim="0">
-  <p:cSld>
-    <p:spTree>
-      <p:nvGrpSpPr>
-        <p:cNvPr id="1" name="Shape 436"/>
-        <p:cNvGrpSpPr/>
-        <p:nvPr/>
-      </p:nvGrpSpPr>
-      <p:grpSpPr>
-        <a:xfrm>
-          <a:off x="0" y="0"/>
-          <a:ext cx="0" cy="0"/>
-          <a:chOff x="0" y="0"/>
-          <a:chExt cx="0" cy="0"/>
-        </a:xfrm>
-      </p:grpSpPr>
-      <p:sp>
-        <p:nvSpPr>
-          <p:cNvPr id="437" name="Google Shape;437;ga073618e60_0_106:notes"/>
-          <p:cNvSpPr>
-            <a:spLocks noGrp="1" noRot="1" noChangeAspect="1"/>
-          </p:cNvSpPr>
-          <p:nvPr>
-            <p:ph type="sldImg" idx="2"/>
-          </p:nvPr>
-        </p:nvSpPr>
-        <p:spPr>
-          <a:xfrm>
-            <a:off x="381000" y="685800"/>
-            <a:ext cx="6096000" cy="3429000"/>
-          </a:xfrm>
-          <a:custGeom>
-            <a:avLst/>
-            <a:gdLst/>
-            <a:ahLst/>
-            <a:cxnLst/>
-            <a:rect l="l" t="t" r="r" b="b"/>
-            <a:pathLst>
-              <a:path w="120000" h="120000" extrusionOk="0">
-                <a:moveTo>
-                  <a:pt x="0" y="0"/>
-                </a:moveTo>
-                <a:lnTo>
-                  <a:pt x="120000" y="0"/>
-                </a:lnTo>
-                <a:lnTo>
-                  <a:pt x="120000" y="120000"/>
-                </a:lnTo>
-                <a:lnTo>
-                  <a:pt x="0" y="120000"/>
-                </a:lnTo>
-                <a:close/>
-              </a:path>
-            </a:pathLst>
-          </a:custGeom>
-        </p:spPr>
-      </p:sp>
-      <p:sp>
-        <p:nvSpPr>
-          <p:cNvPr id="438" name="Google Shape;438;ga073618e60_0_106:notes"/>
-          <p:cNvSpPr txBox="1">
-            <a:spLocks noGrp="1"/>
-          </p:cNvSpPr>
-          <p:nvPr>
-            <p:ph type="body" idx="1"/>
-          </p:nvPr>
-        </p:nvSpPr>
-        <p:spPr>
-          <a:xfrm>
-            <a:off x="685800" y="4343400"/>
-            <a:ext cx="5486400" cy="4114800"/>
-          </a:xfrm>
-          <a:prstGeom prst="rect">
-            <a:avLst/>
-          </a:prstGeom>
-        </p:spPr>
-        <p:txBody>
-          <a:bodyPr spcFirstLastPara="1" wrap="square" lIns="91425" tIns="91425" rIns="91425" bIns="91425" anchor="t" anchorCtr="0">
-            <a:noAutofit/>
-          </a:bodyPr>
-          <a:lstStyle/>
-          <a:p>
-            <a:pPr marL="0" lvl="0" indent="0" algn="l" rtl="0">
-              <a:spcBef>
-                <a:spcPts val="0"/>
-              </a:spcBef>
-              <a:spcAft>
-                <a:spcPts val="0"/>
-              </a:spcAft>
-              <a:buNone/>
-            </a:pPr>
-            <a:endParaRPr/>
-          </a:p>
-        </p:txBody>
-      </p:sp>
-    </p:spTree>
-    <p:extLst>
-      <p:ext uri="{BB962C8B-B14F-4D97-AF65-F5344CB8AC3E}">
-        <p14:creationId xmlns:p14="http://schemas.microsoft.com/office/powerpoint/2010/main" val="1414620248"/>
-      </p:ext>
-    </p:extLst>
   </p:cSld>
   <p:clrMapOvr>
     <a:masterClrMapping/>
@@ -14828,6 +14938,171 @@
         </p:nvSpPr>
         <p:spPr>
           <a:xfrm>
+            <a:off x="673876" y="678739"/>
+            <a:ext cx="9755100" cy="763500"/>
+          </a:xfrm>
+          <a:prstGeom prst="rect">
+            <a:avLst/>
+          </a:prstGeom>
+        </p:spPr>
+        <p:txBody>
+          <a:bodyPr spcFirstLastPara="1" wrap="square" lIns="121900" tIns="121900" rIns="121900" bIns="121900" anchor="t" anchorCtr="0">
+            <a:noAutofit/>
+          </a:bodyPr>
+          <a:lstStyle/>
+          <a:p>
+            <a:pPr marL="0" lvl="0" indent="0" algn="l" rtl="0">
+              <a:spcBef>
+                <a:spcPts val="0"/>
+              </a:spcBef>
+              <a:spcAft>
+                <a:spcPts val="0"/>
+              </a:spcAft>
+              <a:buNone/>
+            </a:pPr>
+            <a:r>
+              <a:rPr lang="fr-FR" dirty="0">
+                <a:solidFill>
+                  <a:srgbClr val="BA94E9"/>
+                </a:solidFill>
+              </a:rPr>
+              <a:t>Architecture réseau </a:t>
+            </a:r>
+            <a:r>
+              <a:rPr lang="fr-FR" dirty="0"/>
+              <a:t>de l’application:</a:t>
+            </a:r>
+            <a:endParaRPr lang="fr-FR" dirty="0">
+              <a:solidFill>
+                <a:srgbClr val="BA94E9"/>
+              </a:solidFill>
+            </a:endParaRPr>
+          </a:p>
+        </p:txBody>
+      </p:sp>
+      <p:pic>
+        <p:nvPicPr>
+          <p:cNvPr id="7" name="Image 6">
+            <a:extLst>
+              <a:ext uri="{FF2B5EF4-FFF2-40B4-BE49-F238E27FC236}">
+                <a16:creationId xmlns:a16="http://schemas.microsoft.com/office/drawing/2014/main" id="{7EDEB57A-04AC-4448-B896-CB1278C0D905}"/>
+              </a:ext>
+            </a:extLst>
+          </p:cNvPr>
+          <p:cNvPicPr>
+            <a:picLocks noChangeAspect="1"/>
+          </p:cNvPicPr>
+          <p:nvPr/>
+        </p:nvPicPr>
+        <p:blipFill rotWithShape="1">
+          <a:blip r:embed="rId3"/>
+          <a:srcRect l="7415" t="14566" r="7472" b="15257"/>
+          <a:stretch/>
+        </p:blipFill>
+        <p:spPr>
+          <a:xfrm>
+            <a:off x="1614755" y="1797978"/>
+            <a:ext cx="8962489" cy="4154617"/>
+          </a:xfrm>
+          <a:prstGeom prst="rect">
+            <a:avLst/>
+          </a:prstGeom>
+        </p:spPr>
+      </p:pic>
+      <p:sp>
+        <p:nvSpPr>
+          <p:cNvPr id="2" name="Rectangle 1">
+            <a:extLst>
+              <a:ext uri="{FF2B5EF4-FFF2-40B4-BE49-F238E27FC236}">
+                <a16:creationId xmlns:a16="http://schemas.microsoft.com/office/drawing/2014/main" id="{7C4DF049-71A0-A6E4-47FC-F40460CF1D40}"/>
+              </a:ext>
+            </a:extLst>
+          </p:cNvPr>
+          <p:cNvSpPr/>
+          <p:nvPr/>
+        </p:nvSpPr>
+        <p:spPr>
+          <a:xfrm>
+            <a:off x="9735738" y="5509211"/>
+            <a:ext cx="186813" cy="88490"/>
+          </a:xfrm>
+          <a:prstGeom prst="rect">
+            <a:avLst/>
+          </a:prstGeom>
+          <a:solidFill>
+            <a:srgbClr val="E5F5FD"/>
+          </a:solidFill>
+          <a:ln>
+            <a:noFill/>
+          </a:ln>
+        </p:spPr>
+        <p:style>
+          <a:lnRef idx="2">
+            <a:schemeClr val="accent1">
+              <a:shade val="15000"/>
+            </a:schemeClr>
+          </a:lnRef>
+          <a:fillRef idx="1">
+            <a:schemeClr val="accent1"/>
+          </a:fillRef>
+          <a:effectRef idx="0">
+            <a:schemeClr val="accent1"/>
+          </a:effectRef>
+          <a:fontRef idx="minor">
+            <a:schemeClr val="lt1"/>
+          </a:fontRef>
+        </p:style>
+        <p:txBody>
+          <a:bodyPr rtlCol="0" anchor="ctr"/>
+          <a:lstStyle/>
+          <a:p>
+            <a:pPr algn="ctr"/>
+            <a:endParaRPr lang="fr-FR" dirty="0"/>
+          </a:p>
+        </p:txBody>
+      </p:sp>
+    </p:spTree>
+    <p:extLst>
+      <p:ext uri="{BB962C8B-B14F-4D97-AF65-F5344CB8AC3E}">
+        <p14:creationId xmlns:p14="http://schemas.microsoft.com/office/powerpoint/2010/main" val="1715813648"/>
+      </p:ext>
+    </p:extLst>
+  </p:cSld>
+  <p:clrMapOvr>
+    <a:masterClrMapping/>
+  </p:clrMapOvr>
+</p:sld>
+</file>
+
+<file path=ppt/slides/slide11.xml><?xml version="1.0" encoding="utf-8"?>
+<p:sld xmlns:a="http://schemas.openxmlformats.org/drawingml/2006/main" xmlns:r="http://schemas.openxmlformats.org/officeDocument/2006/relationships" xmlns:p="http://schemas.openxmlformats.org/presentationml/2006/main">
+  <p:cSld>
+    <p:spTree>
+      <p:nvGrpSpPr>
+        <p:cNvPr id="1" name="Shape 439"/>
+        <p:cNvGrpSpPr/>
+        <p:nvPr/>
+      </p:nvGrpSpPr>
+      <p:grpSpPr>
+        <a:xfrm>
+          <a:off x="0" y="0"/>
+          <a:ext cx="0" cy="0"/>
+          <a:chOff x="0" y="0"/>
+          <a:chExt cx="0" cy="0"/>
+        </a:xfrm>
+      </p:grpSpPr>
+      <p:sp>
+        <p:nvSpPr>
+          <p:cNvPr id="440" name="Google Shape;440;p29"/>
+          <p:cNvSpPr txBox="1">
+            <a:spLocks noGrp="1"/>
+          </p:cNvSpPr>
+          <p:nvPr>
+            <p:ph type="title"/>
+          </p:nvPr>
+        </p:nvSpPr>
+        <p:spPr>
+          <a:xfrm>
             <a:off x="766343" y="483530"/>
             <a:ext cx="9755100" cy="763500"/>
           </a:xfrm>
@@ -14949,7 +15224,7 @@
 </p:sld>
 </file>
 
-<file path=ppt/slides/slide11.xml><?xml version="1.0" encoding="utf-8"?>
+<file path=ppt/slides/slide12.xml><?xml version="1.0" encoding="utf-8"?>
 <p:sld xmlns:a="http://schemas.openxmlformats.org/drawingml/2006/main" xmlns:r="http://schemas.openxmlformats.org/officeDocument/2006/relationships" xmlns:p="http://schemas.openxmlformats.org/presentationml/2006/main">
   <p:cSld>
     <p:spTree>
@@ -15234,7 +15509,7 @@
 </p:sld>
 </file>
 
-<file path=ppt/slides/slide12.xml><?xml version="1.0" encoding="utf-8"?>
+<file path=ppt/slides/slide13.xml><?xml version="1.0" encoding="utf-8"?>
 <p:sld xmlns:a="http://schemas.openxmlformats.org/drawingml/2006/main" xmlns:r="http://schemas.openxmlformats.org/officeDocument/2006/relationships" xmlns:p="http://schemas.openxmlformats.org/presentationml/2006/main">
   <p:cSld>
     <p:spTree>
@@ -15376,6 +15651,58 @@
           </a:prstGeom>
         </p:spPr>
       </p:pic>
+      <p:sp>
+        <p:nvSpPr>
+          <p:cNvPr id="4" name="Rectangle 3">
+            <a:extLst>
+              <a:ext uri="{FF2B5EF4-FFF2-40B4-BE49-F238E27FC236}">
+                <a16:creationId xmlns:a16="http://schemas.microsoft.com/office/drawing/2014/main" id="{1682B3DF-122A-B445-CE70-EB7574A6F1D7}"/>
+              </a:ext>
+            </a:extLst>
+          </p:cNvPr>
+          <p:cNvSpPr/>
+          <p:nvPr/>
+        </p:nvSpPr>
+        <p:spPr>
+          <a:xfrm>
+            <a:off x="9806940" y="2689860"/>
+            <a:ext cx="304800" cy="228600"/>
+          </a:xfrm>
+          <a:prstGeom prst="rect">
+            <a:avLst/>
+          </a:prstGeom>
+          <a:solidFill>
+            <a:srgbClr val="F1F1F1"/>
+          </a:solidFill>
+          <a:ln>
+            <a:noFill/>
+          </a:ln>
+        </p:spPr>
+        <p:style>
+          <a:lnRef idx="2">
+            <a:schemeClr val="dk1">
+              <a:shade val="15000"/>
+            </a:schemeClr>
+          </a:lnRef>
+          <a:fillRef idx="1">
+            <a:schemeClr val="dk1"/>
+          </a:fillRef>
+          <a:effectRef idx="0">
+            <a:schemeClr val="dk1"/>
+          </a:effectRef>
+          <a:fontRef idx="minor">
+            <a:schemeClr val="lt1"/>
+          </a:fontRef>
+        </p:style>
+        <p:txBody>
+          <a:bodyPr rtlCol="0" anchor="ctr"/>
+          <a:lstStyle/>
+          <a:p>
+            <a:pPr algn="ctr"/>
+            <a:endParaRPr lang="fr-FR"/>
+          </a:p>
+        </p:txBody>
+      </p:sp>
     </p:spTree>
     <p:extLst>
       <p:ext uri="{BB962C8B-B14F-4D97-AF65-F5344CB8AC3E}">
@@ -15389,7 +15716,7 @@
 </p:sld>
 </file>
 
-<file path=ppt/slides/slide13.xml><?xml version="1.0" encoding="utf-8"?>
+<file path=ppt/slides/slide14.xml><?xml version="1.0" encoding="utf-8"?>
 <p:sld xmlns:a="http://schemas.openxmlformats.org/drawingml/2006/main" xmlns:r="http://schemas.openxmlformats.org/officeDocument/2006/relationships" xmlns:p="http://schemas.openxmlformats.org/presentationml/2006/main">
   <p:cSld>
     <p:spTree>
@@ -15495,7 +15822,7 @@
             </a:r>
             <a:r>
               <a:rPr lang="fr-FR" dirty="0" err="1"/>
-              <a:t>Canva</a:t>
+              <a:t>PlantUML</a:t>
             </a:r>
             <a:endParaRPr lang="en-US" dirty="0"/>
           </a:p>
@@ -15573,8 +15900,8 @@
 </p:sld>
 </file>
 
-<file path=ppt/slides/slide14.xml><?xml version="1.0" encoding="utf-8"?>
-<p:sld xmlns:a="http://schemas.openxmlformats.org/drawingml/2006/main" xmlns:r="http://schemas.openxmlformats.org/officeDocument/2006/relationships" xmlns:p="http://schemas.openxmlformats.org/presentationml/2006/main">
+<file path=ppt/slides/slide15.xml><?xml version="1.0" encoding="utf-8"?>
+<p:sld xmlns:a="http://schemas.openxmlformats.org/drawingml/2006/main" xmlns:r="http://schemas.openxmlformats.org/officeDocument/2006/relationships" xmlns:p="http://schemas.openxmlformats.org/presentationml/2006/main" show="0">
   <p:cSld>
     <p:spTree>
       <p:nvGrpSpPr>
@@ -16455,7 +16782,7 @@
 </p:sld>
 </file>
 
-<file path=ppt/slides/slide15.xml><?xml version="1.0" encoding="utf-8"?>
+<file path=ppt/slides/slide16.xml><?xml version="1.0" encoding="utf-8"?>
 <p:sld xmlns:a="http://schemas.openxmlformats.org/drawingml/2006/main" xmlns:r="http://schemas.openxmlformats.org/officeDocument/2006/relationships" xmlns:p="http://schemas.openxmlformats.org/presentationml/2006/main">
   <p:cSld>
     <p:spTree>
@@ -16776,7 +17103,7 @@
 </p:sld>
 </file>
 
-<file path=ppt/slides/slide16.xml><?xml version="1.0" encoding="utf-8"?>
+<file path=ppt/slides/slide17.xml><?xml version="1.0" encoding="utf-8"?>
 <p:sld xmlns:a="http://schemas.openxmlformats.org/drawingml/2006/main" xmlns:r="http://schemas.openxmlformats.org/officeDocument/2006/relationships" xmlns:p="http://schemas.openxmlformats.org/presentationml/2006/main">
   <p:cSld>
     <p:spTree>
@@ -19271,14 +19598,313 @@
         </p:blipFill>
         <p:spPr>
           <a:xfrm>
-            <a:off x="2679408" y="1639318"/>
-            <a:ext cx="6833183" cy="4358642"/>
+            <a:off x="3207833" y="2323276"/>
+            <a:ext cx="5776333" cy="3684515"/>
           </a:xfrm>
           <a:prstGeom prst="rect">
             <a:avLst/>
           </a:prstGeom>
         </p:spPr>
       </p:pic>
+      <p:sp>
+        <p:nvSpPr>
+          <p:cNvPr id="4" name="Google Shape;444;p29">
+            <a:extLst>
+              <a:ext uri="{FF2B5EF4-FFF2-40B4-BE49-F238E27FC236}">
+                <a16:creationId xmlns:a16="http://schemas.microsoft.com/office/drawing/2014/main" id="{307E7DD4-64D7-31BE-33E9-829D34655F72}"/>
+              </a:ext>
+            </a:extLst>
+          </p:cNvPr>
+          <p:cNvSpPr txBox="1">
+            <a:spLocks/>
+          </p:cNvSpPr>
+          <p:nvPr/>
+        </p:nvSpPr>
+        <p:spPr>
+          <a:xfrm>
+            <a:off x="799798" y="2220591"/>
+            <a:ext cx="3055675" cy="763500"/>
+          </a:xfrm>
+          <a:prstGeom prst="rect">
+            <a:avLst/>
+          </a:prstGeom>
+          <a:noFill/>
+          <a:ln>
+            <a:noFill/>
+          </a:ln>
+        </p:spPr>
+        <p:txBody>
+          <a:bodyPr spcFirstLastPara="1" wrap="square" lIns="121900" tIns="121900" rIns="121900" bIns="121900" anchor="t" anchorCtr="0">
+            <a:noAutofit/>
+          </a:bodyPr>
+          <a:lstStyle>
+            <a:defPPr marR="0" lvl="0" algn="l" rtl="0">
+              <a:lnSpc>
+                <a:spcPct val="100000"/>
+              </a:lnSpc>
+              <a:spcBef>
+                <a:spcPts val="0"/>
+              </a:spcBef>
+              <a:spcAft>
+                <a:spcPts val="0"/>
+              </a:spcAft>
+            </a:defPPr>
+            <a:lvl1pPr marL="457200" marR="0" lvl="0" indent="-317500" algn="l" rtl="0">
+              <a:lnSpc>
+                <a:spcPct val="115000"/>
+              </a:lnSpc>
+              <a:spcBef>
+                <a:spcPts val="0"/>
+              </a:spcBef>
+              <a:spcAft>
+                <a:spcPts val="0"/>
+              </a:spcAft>
+              <a:buClr>
+                <a:schemeClr val="dk2"/>
+              </a:buClr>
+              <a:buSzPts val="1400"/>
+              <a:buFont typeface="Roboto Mono"/>
+              <a:buChar char="●"/>
+              <a:defRPr sz="1400" b="0" i="0" u="none" strike="noStrike" cap="none">
+                <a:solidFill>
+                  <a:schemeClr val="dk2"/>
+                </a:solidFill>
+                <a:latin typeface="Roboto Mono"/>
+                <a:ea typeface="Roboto Mono"/>
+                <a:cs typeface="Roboto Mono"/>
+                <a:sym typeface="Roboto Mono"/>
+              </a:defRPr>
+            </a:lvl1pPr>
+            <a:lvl2pPr marL="914400" marR="0" lvl="1" indent="-317500" algn="l" rtl="0">
+              <a:lnSpc>
+                <a:spcPct val="115000"/>
+              </a:lnSpc>
+              <a:spcBef>
+                <a:spcPts val="2100"/>
+              </a:spcBef>
+              <a:spcAft>
+                <a:spcPts val="0"/>
+              </a:spcAft>
+              <a:buClr>
+                <a:schemeClr val="dk2"/>
+              </a:buClr>
+              <a:buSzPts val="1400"/>
+              <a:buFont typeface="Roboto Mono"/>
+              <a:buChar char="○"/>
+              <a:defRPr sz="1400" b="0" i="0" u="none" strike="noStrike" cap="none">
+                <a:solidFill>
+                  <a:schemeClr val="dk2"/>
+                </a:solidFill>
+                <a:latin typeface="Roboto Mono"/>
+                <a:ea typeface="Roboto Mono"/>
+                <a:cs typeface="Roboto Mono"/>
+                <a:sym typeface="Roboto Mono"/>
+              </a:defRPr>
+            </a:lvl2pPr>
+            <a:lvl3pPr marL="1371600" marR="0" lvl="2" indent="-317500" algn="l" rtl="0">
+              <a:lnSpc>
+                <a:spcPct val="115000"/>
+              </a:lnSpc>
+              <a:spcBef>
+                <a:spcPts val="2100"/>
+              </a:spcBef>
+              <a:spcAft>
+                <a:spcPts val="0"/>
+              </a:spcAft>
+              <a:buClr>
+                <a:schemeClr val="dk2"/>
+              </a:buClr>
+              <a:buSzPts val="1400"/>
+              <a:buFont typeface="Roboto Mono"/>
+              <a:buChar char="■"/>
+              <a:defRPr sz="1400" b="0" i="0" u="none" strike="noStrike" cap="none">
+                <a:solidFill>
+                  <a:schemeClr val="dk2"/>
+                </a:solidFill>
+                <a:latin typeface="Roboto Mono"/>
+                <a:ea typeface="Roboto Mono"/>
+                <a:cs typeface="Roboto Mono"/>
+                <a:sym typeface="Roboto Mono"/>
+              </a:defRPr>
+            </a:lvl3pPr>
+            <a:lvl4pPr marL="1828800" marR="0" lvl="3" indent="-317500" algn="l" rtl="0">
+              <a:lnSpc>
+                <a:spcPct val="115000"/>
+              </a:lnSpc>
+              <a:spcBef>
+                <a:spcPts val="2100"/>
+              </a:spcBef>
+              <a:spcAft>
+                <a:spcPts val="0"/>
+              </a:spcAft>
+              <a:buClr>
+                <a:schemeClr val="dk2"/>
+              </a:buClr>
+              <a:buSzPts val="1400"/>
+              <a:buFont typeface="Roboto Mono"/>
+              <a:buChar char="●"/>
+              <a:defRPr sz="1400" b="0" i="0" u="none" strike="noStrike" cap="none">
+                <a:solidFill>
+                  <a:schemeClr val="dk2"/>
+                </a:solidFill>
+                <a:latin typeface="Roboto Mono"/>
+                <a:ea typeface="Roboto Mono"/>
+                <a:cs typeface="Roboto Mono"/>
+                <a:sym typeface="Roboto Mono"/>
+              </a:defRPr>
+            </a:lvl4pPr>
+            <a:lvl5pPr marL="2286000" marR="0" lvl="4" indent="-317500" algn="l" rtl="0">
+              <a:lnSpc>
+                <a:spcPct val="115000"/>
+              </a:lnSpc>
+              <a:spcBef>
+                <a:spcPts val="2100"/>
+              </a:spcBef>
+              <a:spcAft>
+                <a:spcPts val="0"/>
+              </a:spcAft>
+              <a:buClr>
+                <a:schemeClr val="dk2"/>
+              </a:buClr>
+              <a:buSzPts val="1400"/>
+              <a:buFont typeface="Roboto Mono"/>
+              <a:buChar char="○"/>
+              <a:defRPr sz="1400" b="0" i="0" u="none" strike="noStrike" cap="none">
+                <a:solidFill>
+                  <a:schemeClr val="dk2"/>
+                </a:solidFill>
+                <a:latin typeface="Roboto Mono"/>
+                <a:ea typeface="Roboto Mono"/>
+                <a:cs typeface="Roboto Mono"/>
+                <a:sym typeface="Roboto Mono"/>
+              </a:defRPr>
+            </a:lvl5pPr>
+            <a:lvl6pPr marL="2743200" marR="0" lvl="5" indent="-317500" algn="l" rtl="0">
+              <a:lnSpc>
+                <a:spcPct val="115000"/>
+              </a:lnSpc>
+              <a:spcBef>
+                <a:spcPts val="2100"/>
+              </a:spcBef>
+              <a:spcAft>
+                <a:spcPts val="0"/>
+              </a:spcAft>
+              <a:buClr>
+                <a:schemeClr val="dk2"/>
+              </a:buClr>
+              <a:buSzPts val="1400"/>
+              <a:buFont typeface="Roboto Mono"/>
+              <a:buChar char="■"/>
+              <a:defRPr sz="1400" b="0" i="0" u="none" strike="noStrike" cap="none">
+                <a:solidFill>
+                  <a:schemeClr val="dk2"/>
+                </a:solidFill>
+                <a:latin typeface="Roboto Mono"/>
+                <a:ea typeface="Roboto Mono"/>
+                <a:cs typeface="Roboto Mono"/>
+                <a:sym typeface="Roboto Mono"/>
+              </a:defRPr>
+            </a:lvl6pPr>
+            <a:lvl7pPr marL="3200400" marR="0" lvl="6" indent="-317500" algn="l" rtl="0">
+              <a:lnSpc>
+                <a:spcPct val="115000"/>
+              </a:lnSpc>
+              <a:spcBef>
+                <a:spcPts val="2100"/>
+              </a:spcBef>
+              <a:spcAft>
+                <a:spcPts val="0"/>
+              </a:spcAft>
+              <a:buClr>
+                <a:schemeClr val="dk2"/>
+              </a:buClr>
+              <a:buSzPts val="1400"/>
+              <a:buFont typeface="Roboto Mono"/>
+              <a:buChar char="●"/>
+              <a:defRPr sz="1400" b="0" i="0" u="none" strike="noStrike" cap="none">
+                <a:solidFill>
+                  <a:schemeClr val="dk2"/>
+                </a:solidFill>
+                <a:latin typeface="Roboto Mono"/>
+                <a:ea typeface="Roboto Mono"/>
+                <a:cs typeface="Roboto Mono"/>
+                <a:sym typeface="Roboto Mono"/>
+              </a:defRPr>
+            </a:lvl7pPr>
+            <a:lvl8pPr marL="3657600" marR="0" lvl="7" indent="-317500" algn="l" rtl="0">
+              <a:lnSpc>
+                <a:spcPct val="115000"/>
+              </a:lnSpc>
+              <a:spcBef>
+                <a:spcPts val="2100"/>
+              </a:spcBef>
+              <a:spcAft>
+                <a:spcPts val="0"/>
+              </a:spcAft>
+              <a:buClr>
+                <a:schemeClr val="dk2"/>
+              </a:buClr>
+              <a:buSzPts val="1400"/>
+              <a:buFont typeface="Roboto Mono"/>
+              <a:buChar char="○"/>
+              <a:defRPr sz="1400" b="0" i="0" u="none" strike="noStrike" cap="none">
+                <a:solidFill>
+                  <a:schemeClr val="dk2"/>
+                </a:solidFill>
+                <a:latin typeface="Roboto Mono"/>
+                <a:ea typeface="Roboto Mono"/>
+                <a:cs typeface="Roboto Mono"/>
+                <a:sym typeface="Roboto Mono"/>
+              </a:defRPr>
+            </a:lvl8pPr>
+            <a:lvl9pPr marL="4114800" marR="0" lvl="8" indent="-317500" algn="l" rtl="0">
+              <a:lnSpc>
+                <a:spcPct val="115000"/>
+              </a:lnSpc>
+              <a:spcBef>
+                <a:spcPts val="2100"/>
+              </a:spcBef>
+              <a:spcAft>
+                <a:spcPts val="2100"/>
+              </a:spcAft>
+              <a:buClr>
+                <a:schemeClr val="dk2"/>
+              </a:buClr>
+              <a:buSzPts val="1400"/>
+              <a:buFont typeface="Roboto Mono"/>
+              <a:buChar char="■"/>
+              <a:defRPr sz="1400" b="0" i="0" u="none" strike="noStrike" cap="none">
+                <a:solidFill>
+                  <a:schemeClr val="dk2"/>
+                </a:solidFill>
+                <a:latin typeface="Roboto Mono"/>
+                <a:ea typeface="Roboto Mono"/>
+                <a:cs typeface="Roboto Mono"/>
+                <a:sym typeface="Roboto Mono"/>
+              </a:defRPr>
+            </a:lvl9pPr>
+          </a:lstStyle>
+          <a:p>
+            <a:pPr marL="0" indent="0">
+              <a:buFont typeface="Roboto Mono"/>
+              <a:buNone/>
+            </a:pPr>
+            <a:r>
+              <a:rPr lang="fr-FR" dirty="0" err="1"/>
+              <a:t>file_name</a:t>
+            </a:r>
+            <a:r>
+              <a:rPr lang="fr-FR" dirty="0"/>
+              <a:t> : </a:t>
+            </a:r>
+            <a:r>
+              <a:rPr lang="fr-FR" dirty="0" err="1"/>
+              <a:t>Dockerfile</a:t>
+            </a:r>
+            <a:endParaRPr lang="en-US" dirty="0"/>
+          </a:p>
+        </p:txBody>
+      </p:sp>
     </p:spTree>
     <p:extLst>
       <p:ext uri="{BB962C8B-B14F-4D97-AF65-F5344CB8AC3E}">
@@ -19293,6 +19919,445 @@
 </file>
 
 <file path=ppt/slides/slide7.xml><?xml version="1.0" encoding="utf-8"?>
+<p:sld xmlns:a="http://schemas.openxmlformats.org/drawingml/2006/main" xmlns:r="http://schemas.openxmlformats.org/officeDocument/2006/relationships" xmlns:p="http://schemas.openxmlformats.org/presentationml/2006/main">
+  <p:cSld>
+    <p:spTree>
+      <p:nvGrpSpPr>
+        <p:cNvPr id="1" name="Shape 439"/>
+        <p:cNvGrpSpPr/>
+        <p:nvPr/>
+      </p:nvGrpSpPr>
+      <p:grpSpPr>
+        <a:xfrm>
+          <a:off x="0" y="0"/>
+          <a:ext cx="0" cy="0"/>
+          <a:chOff x="0" y="0"/>
+          <a:chExt cx="0" cy="0"/>
+        </a:xfrm>
+      </p:grpSpPr>
+      <p:sp>
+        <p:nvSpPr>
+          <p:cNvPr id="440" name="Google Shape;440;p29"/>
+          <p:cNvSpPr txBox="1">
+            <a:spLocks noGrp="1"/>
+          </p:cNvSpPr>
+          <p:nvPr>
+            <p:ph type="title"/>
+          </p:nvPr>
+        </p:nvSpPr>
+        <p:spPr>
+          <a:xfrm>
+            <a:off x="673876" y="678739"/>
+            <a:ext cx="9755100" cy="763500"/>
+          </a:xfrm>
+          <a:prstGeom prst="rect">
+            <a:avLst/>
+          </a:prstGeom>
+        </p:spPr>
+        <p:txBody>
+          <a:bodyPr spcFirstLastPara="1" wrap="square" lIns="121900" tIns="121900" rIns="121900" bIns="121900" anchor="t" anchorCtr="0">
+            <a:noAutofit/>
+          </a:bodyPr>
+          <a:lstStyle/>
+          <a:p>
+            <a:pPr marL="0" lvl="0" indent="0" algn="l" rtl="0">
+              <a:spcBef>
+                <a:spcPts val="0"/>
+              </a:spcBef>
+              <a:spcAft>
+                <a:spcPts val="0"/>
+              </a:spcAft>
+              <a:buNone/>
+            </a:pPr>
+            <a:r>
+              <a:rPr lang="fr-FR" dirty="0">
+                <a:solidFill>
+                  <a:srgbClr val="BA94E9"/>
+                </a:solidFill>
+              </a:rPr>
+              <a:t>Virtualisation </a:t>
+            </a:r>
+            <a:r>
+              <a:rPr lang="fr-FR" dirty="0"/>
+              <a:t>avec Docker:</a:t>
+            </a:r>
+            <a:endParaRPr lang="fr-FR" dirty="0">
+              <a:solidFill>
+                <a:srgbClr val="BA94E9"/>
+              </a:solidFill>
+            </a:endParaRPr>
+          </a:p>
+        </p:txBody>
+      </p:sp>
+      <p:pic>
+        <p:nvPicPr>
+          <p:cNvPr id="4" name="Image 3">
+            <a:extLst>
+              <a:ext uri="{FF2B5EF4-FFF2-40B4-BE49-F238E27FC236}">
+                <a16:creationId xmlns:a16="http://schemas.microsoft.com/office/drawing/2014/main" id="{1AA19807-0A01-6E0C-10A8-9109E89AC573}"/>
+              </a:ext>
+            </a:extLst>
+          </p:cNvPr>
+          <p:cNvPicPr>
+            <a:picLocks noChangeAspect="1"/>
+          </p:cNvPicPr>
+          <p:nvPr/>
+        </p:nvPicPr>
+        <p:blipFill>
+          <a:blip r:embed="rId3"/>
+          <a:stretch>
+            <a:fillRect/>
+          </a:stretch>
+        </p:blipFill>
+        <p:spPr>
+          <a:xfrm>
+            <a:off x="799798" y="2700749"/>
+            <a:ext cx="4394092" cy="2762865"/>
+          </a:xfrm>
+          <a:prstGeom prst="rect">
+            <a:avLst/>
+          </a:prstGeom>
+        </p:spPr>
+      </p:pic>
+      <p:pic>
+        <p:nvPicPr>
+          <p:cNvPr id="6" name="Image 5">
+            <a:extLst>
+              <a:ext uri="{FF2B5EF4-FFF2-40B4-BE49-F238E27FC236}">
+                <a16:creationId xmlns:a16="http://schemas.microsoft.com/office/drawing/2014/main" id="{4DBA288E-47AB-A1E3-A4DA-07FD66630CCD}"/>
+              </a:ext>
+            </a:extLst>
+          </p:cNvPr>
+          <p:cNvPicPr>
+            <a:picLocks noChangeAspect="1"/>
+          </p:cNvPicPr>
+          <p:nvPr/>
+        </p:nvPicPr>
+        <p:blipFill>
+          <a:blip r:embed="rId4"/>
+          <a:stretch>
+            <a:fillRect/>
+          </a:stretch>
+        </p:blipFill>
+        <p:spPr>
+          <a:xfrm>
+            <a:off x="5265546" y="2729422"/>
+            <a:ext cx="6208677" cy="2705517"/>
+          </a:xfrm>
+          <a:prstGeom prst="rect">
+            <a:avLst/>
+          </a:prstGeom>
+        </p:spPr>
+      </p:pic>
+      <p:sp>
+        <p:nvSpPr>
+          <p:cNvPr id="7" name="Google Shape;444;p29">
+            <a:extLst>
+              <a:ext uri="{FF2B5EF4-FFF2-40B4-BE49-F238E27FC236}">
+                <a16:creationId xmlns:a16="http://schemas.microsoft.com/office/drawing/2014/main" id="{312C4986-0F92-749C-DB18-FBFE2D6A11C1}"/>
+              </a:ext>
+            </a:extLst>
+          </p:cNvPr>
+          <p:cNvSpPr txBox="1">
+            <a:spLocks/>
+          </p:cNvSpPr>
+          <p:nvPr/>
+        </p:nvSpPr>
+        <p:spPr>
+          <a:xfrm>
+            <a:off x="799798" y="2220591"/>
+            <a:ext cx="3055675" cy="763500"/>
+          </a:xfrm>
+          <a:prstGeom prst="rect">
+            <a:avLst/>
+          </a:prstGeom>
+          <a:noFill/>
+          <a:ln>
+            <a:noFill/>
+          </a:ln>
+        </p:spPr>
+        <p:txBody>
+          <a:bodyPr spcFirstLastPara="1" wrap="square" lIns="121900" tIns="121900" rIns="121900" bIns="121900" anchor="t" anchorCtr="0">
+            <a:noAutofit/>
+          </a:bodyPr>
+          <a:lstStyle>
+            <a:defPPr marR="0" lvl="0" algn="l" rtl="0">
+              <a:lnSpc>
+                <a:spcPct val="100000"/>
+              </a:lnSpc>
+              <a:spcBef>
+                <a:spcPts val="0"/>
+              </a:spcBef>
+              <a:spcAft>
+                <a:spcPts val="0"/>
+              </a:spcAft>
+            </a:defPPr>
+            <a:lvl1pPr marL="457200" marR="0" lvl="0" indent="-317500" algn="l" rtl="0">
+              <a:lnSpc>
+                <a:spcPct val="115000"/>
+              </a:lnSpc>
+              <a:spcBef>
+                <a:spcPts val="0"/>
+              </a:spcBef>
+              <a:spcAft>
+                <a:spcPts val="0"/>
+              </a:spcAft>
+              <a:buClr>
+                <a:schemeClr val="dk2"/>
+              </a:buClr>
+              <a:buSzPts val="1400"/>
+              <a:buFont typeface="Roboto Mono"/>
+              <a:buChar char="●"/>
+              <a:defRPr sz="1400" b="0" i="0" u="none" strike="noStrike" cap="none">
+                <a:solidFill>
+                  <a:schemeClr val="dk2"/>
+                </a:solidFill>
+                <a:latin typeface="Roboto Mono"/>
+                <a:ea typeface="Roboto Mono"/>
+                <a:cs typeface="Roboto Mono"/>
+                <a:sym typeface="Roboto Mono"/>
+              </a:defRPr>
+            </a:lvl1pPr>
+            <a:lvl2pPr marL="914400" marR="0" lvl="1" indent="-317500" algn="l" rtl="0">
+              <a:lnSpc>
+                <a:spcPct val="115000"/>
+              </a:lnSpc>
+              <a:spcBef>
+                <a:spcPts val="2100"/>
+              </a:spcBef>
+              <a:spcAft>
+                <a:spcPts val="0"/>
+              </a:spcAft>
+              <a:buClr>
+                <a:schemeClr val="dk2"/>
+              </a:buClr>
+              <a:buSzPts val="1400"/>
+              <a:buFont typeface="Roboto Mono"/>
+              <a:buChar char="○"/>
+              <a:defRPr sz="1400" b="0" i="0" u="none" strike="noStrike" cap="none">
+                <a:solidFill>
+                  <a:schemeClr val="dk2"/>
+                </a:solidFill>
+                <a:latin typeface="Roboto Mono"/>
+                <a:ea typeface="Roboto Mono"/>
+                <a:cs typeface="Roboto Mono"/>
+                <a:sym typeface="Roboto Mono"/>
+              </a:defRPr>
+            </a:lvl2pPr>
+            <a:lvl3pPr marL="1371600" marR="0" lvl="2" indent="-317500" algn="l" rtl="0">
+              <a:lnSpc>
+                <a:spcPct val="115000"/>
+              </a:lnSpc>
+              <a:spcBef>
+                <a:spcPts val="2100"/>
+              </a:spcBef>
+              <a:spcAft>
+                <a:spcPts val="0"/>
+              </a:spcAft>
+              <a:buClr>
+                <a:schemeClr val="dk2"/>
+              </a:buClr>
+              <a:buSzPts val="1400"/>
+              <a:buFont typeface="Roboto Mono"/>
+              <a:buChar char="■"/>
+              <a:defRPr sz="1400" b="0" i="0" u="none" strike="noStrike" cap="none">
+                <a:solidFill>
+                  <a:schemeClr val="dk2"/>
+                </a:solidFill>
+                <a:latin typeface="Roboto Mono"/>
+                <a:ea typeface="Roboto Mono"/>
+                <a:cs typeface="Roboto Mono"/>
+                <a:sym typeface="Roboto Mono"/>
+              </a:defRPr>
+            </a:lvl3pPr>
+            <a:lvl4pPr marL="1828800" marR="0" lvl="3" indent="-317500" algn="l" rtl="0">
+              <a:lnSpc>
+                <a:spcPct val="115000"/>
+              </a:lnSpc>
+              <a:spcBef>
+                <a:spcPts val="2100"/>
+              </a:spcBef>
+              <a:spcAft>
+                <a:spcPts val="0"/>
+              </a:spcAft>
+              <a:buClr>
+                <a:schemeClr val="dk2"/>
+              </a:buClr>
+              <a:buSzPts val="1400"/>
+              <a:buFont typeface="Roboto Mono"/>
+              <a:buChar char="●"/>
+              <a:defRPr sz="1400" b="0" i="0" u="none" strike="noStrike" cap="none">
+                <a:solidFill>
+                  <a:schemeClr val="dk2"/>
+                </a:solidFill>
+                <a:latin typeface="Roboto Mono"/>
+                <a:ea typeface="Roboto Mono"/>
+                <a:cs typeface="Roboto Mono"/>
+                <a:sym typeface="Roboto Mono"/>
+              </a:defRPr>
+            </a:lvl4pPr>
+            <a:lvl5pPr marL="2286000" marR="0" lvl="4" indent="-317500" algn="l" rtl="0">
+              <a:lnSpc>
+                <a:spcPct val="115000"/>
+              </a:lnSpc>
+              <a:spcBef>
+                <a:spcPts val="2100"/>
+              </a:spcBef>
+              <a:spcAft>
+                <a:spcPts val="0"/>
+              </a:spcAft>
+              <a:buClr>
+                <a:schemeClr val="dk2"/>
+              </a:buClr>
+              <a:buSzPts val="1400"/>
+              <a:buFont typeface="Roboto Mono"/>
+              <a:buChar char="○"/>
+              <a:defRPr sz="1400" b="0" i="0" u="none" strike="noStrike" cap="none">
+                <a:solidFill>
+                  <a:schemeClr val="dk2"/>
+                </a:solidFill>
+                <a:latin typeface="Roboto Mono"/>
+                <a:ea typeface="Roboto Mono"/>
+                <a:cs typeface="Roboto Mono"/>
+                <a:sym typeface="Roboto Mono"/>
+              </a:defRPr>
+            </a:lvl5pPr>
+            <a:lvl6pPr marL="2743200" marR="0" lvl="5" indent="-317500" algn="l" rtl="0">
+              <a:lnSpc>
+                <a:spcPct val="115000"/>
+              </a:lnSpc>
+              <a:spcBef>
+                <a:spcPts val="2100"/>
+              </a:spcBef>
+              <a:spcAft>
+                <a:spcPts val="0"/>
+              </a:spcAft>
+              <a:buClr>
+                <a:schemeClr val="dk2"/>
+              </a:buClr>
+              <a:buSzPts val="1400"/>
+              <a:buFont typeface="Roboto Mono"/>
+              <a:buChar char="■"/>
+              <a:defRPr sz="1400" b="0" i="0" u="none" strike="noStrike" cap="none">
+                <a:solidFill>
+                  <a:schemeClr val="dk2"/>
+                </a:solidFill>
+                <a:latin typeface="Roboto Mono"/>
+                <a:ea typeface="Roboto Mono"/>
+                <a:cs typeface="Roboto Mono"/>
+                <a:sym typeface="Roboto Mono"/>
+              </a:defRPr>
+            </a:lvl6pPr>
+            <a:lvl7pPr marL="3200400" marR="0" lvl="6" indent="-317500" algn="l" rtl="0">
+              <a:lnSpc>
+                <a:spcPct val="115000"/>
+              </a:lnSpc>
+              <a:spcBef>
+                <a:spcPts val="2100"/>
+              </a:spcBef>
+              <a:spcAft>
+                <a:spcPts val="0"/>
+              </a:spcAft>
+              <a:buClr>
+                <a:schemeClr val="dk2"/>
+              </a:buClr>
+              <a:buSzPts val="1400"/>
+              <a:buFont typeface="Roboto Mono"/>
+              <a:buChar char="●"/>
+              <a:defRPr sz="1400" b="0" i="0" u="none" strike="noStrike" cap="none">
+                <a:solidFill>
+                  <a:schemeClr val="dk2"/>
+                </a:solidFill>
+                <a:latin typeface="Roboto Mono"/>
+                <a:ea typeface="Roboto Mono"/>
+                <a:cs typeface="Roboto Mono"/>
+                <a:sym typeface="Roboto Mono"/>
+              </a:defRPr>
+            </a:lvl7pPr>
+            <a:lvl8pPr marL="3657600" marR="0" lvl="7" indent="-317500" algn="l" rtl="0">
+              <a:lnSpc>
+                <a:spcPct val="115000"/>
+              </a:lnSpc>
+              <a:spcBef>
+                <a:spcPts val="2100"/>
+              </a:spcBef>
+              <a:spcAft>
+                <a:spcPts val="0"/>
+              </a:spcAft>
+              <a:buClr>
+                <a:schemeClr val="dk2"/>
+              </a:buClr>
+              <a:buSzPts val="1400"/>
+              <a:buFont typeface="Roboto Mono"/>
+              <a:buChar char="○"/>
+              <a:defRPr sz="1400" b="0" i="0" u="none" strike="noStrike" cap="none">
+                <a:solidFill>
+                  <a:schemeClr val="dk2"/>
+                </a:solidFill>
+                <a:latin typeface="Roboto Mono"/>
+                <a:ea typeface="Roboto Mono"/>
+                <a:cs typeface="Roboto Mono"/>
+                <a:sym typeface="Roboto Mono"/>
+              </a:defRPr>
+            </a:lvl8pPr>
+            <a:lvl9pPr marL="4114800" marR="0" lvl="8" indent="-317500" algn="l" rtl="0">
+              <a:lnSpc>
+                <a:spcPct val="115000"/>
+              </a:lnSpc>
+              <a:spcBef>
+                <a:spcPts val="2100"/>
+              </a:spcBef>
+              <a:spcAft>
+                <a:spcPts val="2100"/>
+              </a:spcAft>
+              <a:buClr>
+                <a:schemeClr val="dk2"/>
+              </a:buClr>
+              <a:buSzPts val="1400"/>
+              <a:buFont typeface="Roboto Mono"/>
+              <a:buChar char="■"/>
+              <a:defRPr sz="1400" b="0" i="0" u="none" strike="noStrike" cap="none">
+                <a:solidFill>
+                  <a:schemeClr val="dk2"/>
+                </a:solidFill>
+                <a:latin typeface="Roboto Mono"/>
+                <a:ea typeface="Roboto Mono"/>
+                <a:cs typeface="Roboto Mono"/>
+                <a:sym typeface="Roboto Mono"/>
+              </a:defRPr>
+            </a:lvl9pPr>
+          </a:lstStyle>
+          <a:p>
+            <a:pPr marL="0" indent="0">
+              <a:buFont typeface="Roboto Mono"/>
+              <a:buNone/>
+            </a:pPr>
+            <a:r>
+              <a:rPr lang="fr-FR" dirty="0" err="1"/>
+              <a:t>file_name</a:t>
+            </a:r>
+            <a:r>
+              <a:rPr lang="fr-FR" dirty="0"/>
+              <a:t> : api.py</a:t>
+            </a:r>
+            <a:endParaRPr lang="en-US" dirty="0"/>
+          </a:p>
+        </p:txBody>
+      </p:sp>
+    </p:spTree>
+    <p:extLst>
+      <p:ext uri="{BB962C8B-B14F-4D97-AF65-F5344CB8AC3E}">
+        <p14:creationId xmlns:p14="http://schemas.microsoft.com/office/powerpoint/2010/main" val="4267884152"/>
+      </p:ext>
+    </p:extLst>
+  </p:cSld>
+  <p:clrMapOvr>
+    <a:masterClrMapping/>
+  </p:clrMapOvr>
+</p:sld>
+</file>
+
+<file path=ppt/slides/slide8.xml><?xml version="1.0" encoding="utf-8"?>
 <p:sld xmlns:a="http://schemas.openxmlformats.org/drawingml/2006/main" xmlns:r="http://schemas.openxmlformats.org/officeDocument/2006/relationships" xmlns:p="http://schemas.openxmlformats.org/presentationml/2006/main">
   <p:cSld>
     <p:spTree>
@@ -20062,7 +21127,7 @@
 </p:sld>
 </file>
 
-<file path=ppt/slides/slide8.xml><?xml version="1.0" encoding="utf-8"?>
+<file path=ppt/slides/slide9.xml><?xml version="1.0" encoding="utf-8"?>
 <p:sld xmlns:a="http://schemas.openxmlformats.org/drawingml/2006/main" xmlns:r="http://schemas.openxmlformats.org/officeDocument/2006/relationships" xmlns:p="http://schemas.openxmlformats.org/presentationml/2006/main">
   <p:cSld>
     <p:spTree>
@@ -20311,171 +21376,6 @@
         </p:spPr>
       </p:pic>
     </p:spTree>
-  </p:cSld>
-  <p:clrMapOvr>
-    <a:masterClrMapping/>
-  </p:clrMapOvr>
-</p:sld>
-</file>
-
-<file path=ppt/slides/slide9.xml><?xml version="1.0" encoding="utf-8"?>
-<p:sld xmlns:a="http://schemas.openxmlformats.org/drawingml/2006/main" xmlns:r="http://schemas.openxmlformats.org/officeDocument/2006/relationships" xmlns:p="http://schemas.openxmlformats.org/presentationml/2006/main">
-  <p:cSld>
-    <p:spTree>
-      <p:nvGrpSpPr>
-        <p:cNvPr id="1" name="Shape 439"/>
-        <p:cNvGrpSpPr/>
-        <p:nvPr/>
-      </p:nvGrpSpPr>
-      <p:grpSpPr>
-        <a:xfrm>
-          <a:off x="0" y="0"/>
-          <a:ext cx="0" cy="0"/>
-          <a:chOff x="0" y="0"/>
-          <a:chExt cx="0" cy="0"/>
-        </a:xfrm>
-      </p:grpSpPr>
-      <p:sp>
-        <p:nvSpPr>
-          <p:cNvPr id="440" name="Google Shape;440;p29"/>
-          <p:cNvSpPr txBox="1">
-            <a:spLocks noGrp="1"/>
-          </p:cNvSpPr>
-          <p:nvPr>
-            <p:ph type="title"/>
-          </p:nvPr>
-        </p:nvSpPr>
-        <p:spPr>
-          <a:xfrm>
-            <a:off x="673876" y="678739"/>
-            <a:ext cx="9755100" cy="763500"/>
-          </a:xfrm>
-          <a:prstGeom prst="rect">
-            <a:avLst/>
-          </a:prstGeom>
-        </p:spPr>
-        <p:txBody>
-          <a:bodyPr spcFirstLastPara="1" wrap="square" lIns="121900" tIns="121900" rIns="121900" bIns="121900" anchor="t" anchorCtr="0">
-            <a:noAutofit/>
-          </a:bodyPr>
-          <a:lstStyle/>
-          <a:p>
-            <a:pPr marL="0" lvl="0" indent="0" algn="l" rtl="0">
-              <a:spcBef>
-                <a:spcPts val="0"/>
-              </a:spcBef>
-              <a:spcAft>
-                <a:spcPts val="0"/>
-              </a:spcAft>
-              <a:buNone/>
-            </a:pPr>
-            <a:r>
-              <a:rPr lang="fr-FR" dirty="0">
-                <a:solidFill>
-                  <a:srgbClr val="BA94E9"/>
-                </a:solidFill>
-              </a:rPr>
-              <a:t>Architecture réseau </a:t>
-            </a:r>
-            <a:r>
-              <a:rPr lang="fr-FR" dirty="0"/>
-              <a:t>de l’application:</a:t>
-            </a:r>
-            <a:endParaRPr lang="fr-FR" dirty="0">
-              <a:solidFill>
-                <a:srgbClr val="BA94E9"/>
-              </a:solidFill>
-            </a:endParaRPr>
-          </a:p>
-        </p:txBody>
-      </p:sp>
-      <p:pic>
-        <p:nvPicPr>
-          <p:cNvPr id="7" name="Image 6">
-            <a:extLst>
-              <a:ext uri="{FF2B5EF4-FFF2-40B4-BE49-F238E27FC236}">
-                <a16:creationId xmlns:a16="http://schemas.microsoft.com/office/drawing/2014/main" id="{7EDEB57A-04AC-4448-B896-CB1278C0D905}"/>
-              </a:ext>
-            </a:extLst>
-          </p:cNvPr>
-          <p:cNvPicPr>
-            <a:picLocks noChangeAspect="1"/>
-          </p:cNvPicPr>
-          <p:nvPr/>
-        </p:nvPicPr>
-        <p:blipFill rotWithShape="1">
-          <a:blip r:embed="rId3"/>
-          <a:srcRect l="7415" t="14566" r="7472" b="15257"/>
-          <a:stretch/>
-        </p:blipFill>
-        <p:spPr>
-          <a:xfrm>
-            <a:off x="1614755" y="1797978"/>
-            <a:ext cx="8962489" cy="4154617"/>
-          </a:xfrm>
-          <a:prstGeom prst="rect">
-            <a:avLst/>
-          </a:prstGeom>
-        </p:spPr>
-      </p:pic>
-      <p:sp>
-        <p:nvSpPr>
-          <p:cNvPr id="2" name="Rectangle 1">
-            <a:extLst>
-              <a:ext uri="{FF2B5EF4-FFF2-40B4-BE49-F238E27FC236}">
-                <a16:creationId xmlns:a16="http://schemas.microsoft.com/office/drawing/2014/main" id="{7C4DF049-71A0-A6E4-47FC-F40460CF1D40}"/>
-              </a:ext>
-            </a:extLst>
-          </p:cNvPr>
-          <p:cNvSpPr/>
-          <p:nvPr/>
-        </p:nvSpPr>
-        <p:spPr>
-          <a:xfrm>
-            <a:off x="9735738" y="5509211"/>
-            <a:ext cx="186813" cy="88490"/>
-          </a:xfrm>
-          <a:prstGeom prst="rect">
-            <a:avLst/>
-          </a:prstGeom>
-          <a:solidFill>
-            <a:srgbClr val="E5F5FD"/>
-          </a:solidFill>
-          <a:ln>
-            <a:noFill/>
-          </a:ln>
-        </p:spPr>
-        <p:style>
-          <a:lnRef idx="2">
-            <a:schemeClr val="accent1">
-              <a:shade val="15000"/>
-            </a:schemeClr>
-          </a:lnRef>
-          <a:fillRef idx="1">
-            <a:schemeClr val="accent1"/>
-          </a:fillRef>
-          <a:effectRef idx="0">
-            <a:schemeClr val="accent1"/>
-          </a:effectRef>
-          <a:fontRef idx="minor">
-            <a:schemeClr val="lt1"/>
-          </a:fontRef>
-        </p:style>
-        <p:txBody>
-          <a:bodyPr rtlCol="0" anchor="ctr"/>
-          <a:lstStyle/>
-          <a:p>
-            <a:pPr algn="ctr"/>
-            <a:endParaRPr lang="fr-FR" dirty="0"/>
-          </a:p>
-        </p:txBody>
-      </p:sp>
-    </p:spTree>
-    <p:extLst>
-      <p:ext uri="{BB962C8B-B14F-4D97-AF65-F5344CB8AC3E}">
-        <p14:creationId xmlns:p14="http://schemas.microsoft.com/office/powerpoint/2010/main" val="1715813648"/>
-      </p:ext>
-    </p:extLst>
   </p:cSld>
   <p:clrMapOvr>
     <a:masterClrMapping/>

</xml_diff>